<commit_message>
Add value generation to website
</commit_message>
<xml_diff>
--- a/FlaskApp/generated/Company51ByDeptFrom2022-06-01To2022-06-20.pptx
+++ b/FlaskApp/generated/Company51ByDeptFrom2022-06-01To2022-06-20.pptx
@@ -3716,7 +3716,7 @@
                     <a:lstStyle/>
                     <a:p>
                       <a:r>
-                        <a:t>282</a:t>
+                        <a:t>286</a:t>
                       </a:r>
                     </a:p>
                   </a:txBody>
@@ -3816,19 +3816,19 @@
                     <a:lstStyle/>
                     <a:p>
                       <a:r>
-                        <a:t>298</a:t>
-                      </a:r>
-                    </a:p>
-                  </a:txBody>
-                  <a:tcPr/>
-                </a:tc>
-                <a:tc>
-                  <a:txBody>
-                    <a:bodyPr/>
-                    <a:lstStyle/>
-                    <a:p>
-                      <a:r>
-                        <a:t>302</a:t>
+                        <a:t>3192</a:t>
+                      </a:r>
+                    </a:p>
+                  </a:txBody>
+                  <a:tcPr/>
+                </a:tc>
+                <a:tc>
+                  <a:txBody>
+                    <a:bodyPr/>
+                    <a:lstStyle/>
+                    <a:p>
+                      <a:r>
+                        <a:t>3192</a:t>
                       </a:r>
                     </a:p>
                   </a:txBody>
@@ -7540,7 +7540,7 @@
                     <a:lstStyle/>
                     <a:p>
                       <a:r>
-                        <a:t>171</a:t>
+                        <a:t>172</a:t>
                       </a:r>
                     </a:p>
                   </a:txBody>
@@ -7640,7 +7640,7 @@
                     <a:lstStyle/>
                     <a:p>
                       <a:r>
-                        <a:t>214</a:t>
+                        <a:t>338</a:t>
                       </a:r>
                     </a:p>
                   </a:txBody>
@@ -7690,7 +7690,7 @@
                     <a:lstStyle/>
                     <a:p>
                       <a:r>
-                        <a:t>160</a:t>
+                        <a:t>236</a:t>
                       </a:r>
                     </a:p>
                   </a:txBody>
@@ -7740,7 +7740,7 @@
                     <a:lstStyle/>
                     <a:p>
                       <a:r>
-                        <a:t>64</a:t>
+                        <a:t>67</a:t>
                       </a:r>
                     </a:p>
                   </a:txBody>
@@ -7840,7 +7840,7 @@
                     <a:lstStyle/>
                     <a:p>
                       <a:r>
-                        <a:t>209</a:t>
+                        <a:t>211</a:t>
                       </a:r>
                     </a:p>
                   </a:txBody>
@@ -7890,7 +7890,7 @@
                     <a:lstStyle/>
                     <a:p>
                       <a:r>
-                        <a:t>137</a:t>
+                        <a:t>139</a:t>
                       </a:r>
                     </a:p>
                   </a:txBody>
@@ -7940,19 +7940,19 @@
                     <a:lstStyle/>
                     <a:p>
                       <a:r>
-                        <a:t>2680</a:t>
-                      </a:r>
-                    </a:p>
-                  </a:txBody>
-                  <a:tcPr/>
-                </a:tc>
-                <a:tc>
-                  <a:txBody>
-                    <a:bodyPr/>
-                    <a:lstStyle/>
-                    <a:p>
-                      <a:r>
-                        <a:t>2890</a:t>
+                        <a:t>3190</a:t>
+                      </a:r>
+                    </a:p>
+                  </a:txBody>
+                  <a:tcPr/>
+                </a:tc>
+                <a:tc>
+                  <a:txBody>
+                    <a:bodyPr/>
+                    <a:lstStyle/>
+                    <a:p>
+                      <a:r>
+                        <a:t>3192</a:t>
                       </a:r>
                     </a:p>
                   </a:txBody>

</xml_diff>